<commit_message>
change summary file path
</commit_message>
<xml_diff>
--- a/slides.pptx
+++ b/slides.pptx
@@ -29,8 +29,8 @@
     <p:sldId id="385" r:id="rId26"/>
     <p:sldId id="360" r:id="rId27"/>
     <p:sldId id="375" r:id="rId28"/>
-    <p:sldId id="376" r:id="rId29"/>
-    <p:sldId id="363" r:id="rId30"/>
+    <p:sldId id="363" r:id="rId29"/>
+    <p:sldId id="376" r:id="rId30"/>
     <p:sldId id="377" r:id="rId31"/>
     <p:sldId id="364" r:id="rId32"/>
     <p:sldId id="378" r:id="rId33"/>
@@ -14947,6 +14947,62 @@
       </p:grpSpPr>
       <p:sp>
         <p:nvSpPr>
+          <p:cNvPr id="3" name="Content Placeholder 2">
+            <a:extLst>
+              <a:ext uri="{FF2B5EF4-FFF2-40B4-BE49-F238E27FC236}">
+                <a16:creationId xmlns:a16="http://schemas.microsoft.com/office/drawing/2014/main" id="{6AB250FE-08C8-4530-B722-29C38A359D8B}"/>
+              </a:ext>
+            </a:extLst>
+          </p:cNvPr>
+          <p:cNvSpPr>
+            <a:spLocks noGrp="1"/>
+          </p:cNvSpPr>
+          <p:nvPr>
+            <p:ph sz="half" idx="2"/>
+          </p:nvPr>
+        </p:nvSpPr>
+        <p:spPr>
+          <a:xfrm>
+            <a:off x="1097280" y="1602378"/>
+            <a:ext cx="10058400" cy="4266718"/>
+          </a:xfrm>
+        </p:spPr>
+        <p:txBody>
+          <a:bodyPr>
+            <a:normAutofit/>
+          </a:bodyPr>
+          <a:lstStyle/>
+          <a:p>
+            <a:r>
+              <a:rPr lang="en-US" sz="1800" dirty="0"/>
+              <a:t>In this section, we present the experiments and discuss the results. We first show results on validation data for several variants of the proposed architecture. Next, </a:t>
+            </a:r>
+            <a:r>
+              <a:rPr lang="en-US" sz="1800" dirty="0" err="1"/>
+              <a:t>Key.Net</a:t>
+            </a:r>
+            <a:r>
+              <a:rPr lang="en-US" sz="1800" dirty="0"/>
+              <a:t> repeatability scores in single-scale and multi-scale are presented along with the state-of-the art detectors on </a:t>
+            </a:r>
+            <a:r>
+              <a:rPr lang="en-US" sz="1800" dirty="0" err="1"/>
+              <a:t>HPatches</a:t>
+            </a:r>
+            <a:r>
+              <a:rPr lang="en-US" sz="1800" dirty="0"/>
+              <a:t>. Moreover, we evaluate the matching performance, the number of learnable parameters and inference time of our proposed detector and compare to other techniques.</a:t>
+            </a:r>
+            <a:endParaRPr lang="en-US" sz="1800" dirty="0">
+              <a:solidFill>
+                <a:schemeClr val="tx1"/>
+              </a:solidFill>
+            </a:endParaRPr>
+          </a:p>
+        </p:txBody>
+      </p:sp>
+      <p:sp>
+        <p:nvSpPr>
           <p:cNvPr id="2" name="Title 1">
             <a:extLst>
               <a:ext uri="{FF2B5EF4-FFF2-40B4-BE49-F238E27FC236}">
@@ -14973,8 +15029,72 @@
           <a:p>
             <a:r>
               <a:rPr lang="en-US" dirty="0"/>
-              <a:t>Implementation Notes</a:t>
-            </a:r>
+              <a:t>Results</a:t>
+            </a:r>
+          </a:p>
+        </p:txBody>
+      </p:sp>
+    </p:spTree>
+    <p:extLst>
+      <p:ext uri="{BB962C8B-B14F-4D97-AF65-F5344CB8AC3E}">
+        <p14:creationId xmlns:p14="http://schemas.microsoft.com/office/powerpoint/2010/main" val="1169903759"/>
+      </p:ext>
+    </p:extLst>
+  </p:cSld>
+  <p:clrMapOvr>
+    <a:masterClrMapping/>
+  </p:clrMapOvr>
+</p:sld>
+</file>
+
+<file path=ppt/slides/slide26.xml><?xml version="1.0" encoding="utf-8"?>
+<p:sld xmlns:a="http://schemas.openxmlformats.org/drawingml/2006/main" xmlns:r="http://schemas.openxmlformats.org/officeDocument/2006/relationships" xmlns:p="http://schemas.openxmlformats.org/presentationml/2006/main">
+  <p:cSld>
+    <p:spTree>
+      <p:nvGrpSpPr>
+        <p:cNvPr id="1" name=""/>
+        <p:cNvGrpSpPr/>
+        <p:nvPr/>
+      </p:nvGrpSpPr>
+      <p:grpSpPr>
+        <a:xfrm>
+          <a:off x="0" y="0"/>
+          <a:ext cx="0" cy="0"/>
+          <a:chOff x="0" y="0"/>
+          <a:chExt cx="0" cy="0"/>
+        </a:xfrm>
+      </p:grpSpPr>
+      <p:sp>
+        <p:nvSpPr>
+          <p:cNvPr id="2" name="Title 1">
+            <a:extLst>
+              <a:ext uri="{FF2B5EF4-FFF2-40B4-BE49-F238E27FC236}">
+                <a16:creationId xmlns:a16="http://schemas.microsoft.com/office/drawing/2014/main" id="{CDC62B56-74BF-47D4-B1CD-AF93A810B3B7}"/>
+              </a:ext>
+            </a:extLst>
+          </p:cNvPr>
+          <p:cNvSpPr>
+            <a:spLocks noGrp="1"/>
+          </p:cNvSpPr>
+          <p:nvPr>
+            <p:ph type="title"/>
+          </p:nvPr>
+        </p:nvSpPr>
+        <p:spPr>
+          <a:xfrm>
+            <a:off x="1097280" y="942871"/>
+            <a:ext cx="10058400" cy="587584"/>
+          </a:xfrm>
+        </p:spPr>
+        <p:txBody>
+          <a:bodyPr/>
+          <a:lstStyle/>
+          <a:p>
+            <a:r>
+              <a:rPr lang="en-US" dirty="0"/>
+              <a:t>Preliminary Analysis</a:t>
+            </a:r>
+            <a:endParaRPr lang="en-US" dirty="0"/>
           </a:p>
         </p:txBody>
       </p:sp>
@@ -15117,125 +15237,6 @@
     <p:extLst>
       <p:ext uri="{BB962C8B-B14F-4D97-AF65-F5344CB8AC3E}">
         <p14:creationId xmlns:p14="http://schemas.microsoft.com/office/powerpoint/2010/main" val="338996607"/>
-      </p:ext>
-    </p:extLst>
-  </p:cSld>
-  <p:clrMapOvr>
-    <a:masterClrMapping/>
-  </p:clrMapOvr>
-</p:sld>
-</file>
-
-<file path=ppt/slides/slide26.xml><?xml version="1.0" encoding="utf-8"?>
-<p:sld xmlns:a="http://schemas.openxmlformats.org/drawingml/2006/main" xmlns:r="http://schemas.openxmlformats.org/officeDocument/2006/relationships" xmlns:p="http://schemas.openxmlformats.org/presentationml/2006/main">
-  <p:cSld>
-    <p:spTree>
-      <p:nvGrpSpPr>
-        <p:cNvPr id="1" name=""/>
-        <p:cNvGrpSpPr/>
-        <p:nvPr/>
-      </p:nvGrpSpPr>
-      <p:grpSpPr>
-        <a:xfrm>
-          <a:off x="0" y="0"/>
-          <a:ext cx="0" cy="0"/>
-          <a:chOff x="0" y="0"/>
-          <a:chExt cx="0" cy="0"/>
-        </a:xfrm>
-      </p:grpSpPr>
-      <p:sp>
-        <p:nvSpPr>
-          <p:cNvPr id="3" name="Content Placeholder 2">
-            <a:extLst>
-              <a:ext uri="{FF2B5EF4-FFF2-40B4-BE49-F238E27FC236}">
-                <a16:creationId xmlns:a16="http://schemas.microsoft.com/office/drawing/2014/main" id="{6AB250FE-08C8-4530-B722-29C38A359D8B}"/>
-              </a:ext>
-            </a:extLst>
-          </p:cNvPr>
-          <p:cNvSpPr>
-            <a:spLocks noGrp="1"/>
-          </p:cNvSpPr>
-          <p:nvPr>
-            <p:ph sz="half" idx="2"/>
-          </p:nvPr>
-        </p:nvSpPr>
-        <p:spPr>
-          <a:xfrm>
-            <a:off x="1097280" y="1602378"/>
-            <a:ext cx="10058400" cy="4266718"/>
-          </a:xfrm>
-        </p:spPr>
-        <p:txBody>
-          <a:bodyPr>
-            <a:normAutofit/>
-          </a:bodyPr>
-          <a:lstStyle/>
-          <a:p>
-            <a:r>
-              <a:rPr lang="en-US" sz="1800" dirty="0"/>
-              <a:t>In this section, we present the experiments and discuss the results. We first show results on validation data for several variants of the proposed architecture. Next, </a:t>
-            </a:r>
-            <a:r>
-              <a:rPr lang="en-US" sz="1800" dirty="0" err="1"/>
-              <a:t>Key.Net</a:t>
-            </a:r>
-            <a:r>
-              <a:rPr lang="en-US" sz="1800" dirty="0"/>
-              <a:t> repeatability scores in single-scale and multi-scale are presented along with the state-of-the art detectors on </a:t>
-            </a:r>
-            <a:r>
-              <a:rPr lang="en-US" sz="1800" dirty="0" err="1"/>
-              <a:t>HPatches</a:t>
-            </a:r>
-            <a:r>
-              <a:rPr lang="en-US" sz="1800" dirty="0"/>
-              <a:t>. Moreover, we evaluate the matching performance, the number of learnable parameters and inference time of our proposed detector and compare to other techniques.</a:t>
-            </a:r>
-            <a:endParaRPr lang="en-US" sz="1800" dirty="0">
-              <a:solidFill>
-                <a:schemeClr val="tx1"/>
-              </a:solidFill>
-            </a:endParaRPr>
-          </a:p>
-        </p:txBody>
-      </p:sp>
-      <p:sp>
-        <p:nvSpPr>
-          <p:cNvPr id="2" name="Title 1">
-            <a:extLst>
-              <a:ext uri="{FF2B5EF4-FFF2-40B4-BE49-F238E27FC236}">
-                <a16:creationId xmlns:a16="http://schemas.microsoft.com/office/drawing/2014/main" id="{CDC62B56-74BF-47D4-B1CD-AF93A810B3B7}"/>
-              </a:ext>
-            </a:extLst>
-          </p:cNvPr>
-          <p:cNvSpPr>
-            <a:spLocks noGrp="1"/>
-          </p:cNvSpPr>
-          <p:nvPr>
-            <p:ph type="title"/>
-          </p:nvPr>
-        </p:nvSpPr>
-        <p:spPr>
-          <a:xfrm>
-            <a:off x="1097280" y="942871"/>
-            <a:ext cx="10058400" cy="587584"/>
-          </a:xfrm>
-        </p:spPr>
-        <p:txBody>
-          <a:bodyPr/>
-          <a:lstStyle/>
-          <a:p>
-            <a:r>
-              <a:rPr lang="en-US" dirty="0"/>
-              <a:t>Results</a:t>
-            </a:r>
-          </a:p>
-        </p:txBody>
-      </p:sp>
-    </p:spTree>
-    <p:extLst>
-      <p:ext uri="{BB962C8B-B14F-4D97-AF65-F5344CB8AC3E}">
-        <p14:creationId xmlns:p14="http://schemas.microsoft.com/office/powerpoint/2010/main" val="1169903759"/>
       </p:ext>
     </p:extLst>
   </p:cSld>
@@ -20300,16 +20301,16 @@
 <file path=customXml/itemProps1.xml><?xml version="1.0" encoding="utf-8"?>
 <ds:datastoreItem xmlns:ds="http://schemas.openxmlformats.org/officeDocument/2006/customXml" ds:itemID="{44FAF7B5-E40C-46BE-9C83-DA251FCAE61E}">
   <ds:schemaRefs>
-    <ds:schemaRef ds:uri="http://schemas.openxmlformats.org/package/2006/metadata/core-properties"/>
-    <ds:schemaRef ds:uri="http://schemas.microsoft.com/office/2006/documentManagement/types"/>
     <ds:schemaRef ds:uri="http://purl.org/dc/elements/1.1/"/>
-    <ds:schemaRef ds:uri="http://purl.org/dc/terms/"/>
-    <ds:schemaRef ds:uri="http://schemas.microsoft.com/office/infopath/2007/PartnerControls"/>
-    <ds:schemaRef ds:uri="71af3243-3dd4-4a8d-8c0d-dd76da1f02a5"/>
-    <ds:schemaRef ds:uri="http://purl.org/dc/dcmitype/"/>
     <ds:schemaRef ds:uri="16c05727-aa75-4e4a-9b5f-8a80a1165891"/>
     <ds:schemaRef ds:uri="http://schemas.microsoft.com/office/2006/metadata/properties"/>
+    <ds:schemaRef ds:uri="http://schemas.microsoft.com/office/2006/documentManagement/types"/>
+    <ds:schemaRef ds:uri="http://schemas.microsoft.com/office/infopath/2007/PartnerControls"/>
+    <ds:schemaRef ds:uri="http://schemas.openxmlformats.org/package/2006/metadata/core-properties"/>
+    <ds:schemaRef ds:uri="71af3243-3dd4-4a8d-8c0d-dd76da1f02a5"/>
     <ds:schemaRef ds:uri="http://www.w3.org/XML/1998/namespace"/>
+    <ds:schemaRef ds:uri="http://purl.org/dc/dcmitype/"/>
+    <ds:schemaRef ds:uri="http://purl.org/dc/terms/"/>
   </ds:schemaRefs>
 </ds:datastoreItem>
 </file>

</xml_diff>